<commit_message>
Added visual for usecases
</commit_message>
<xml_diff>
--- a/design_docs/design_document.pptx
+++ b/design_docs/design_document.pptx
@@ -240,7 +240,7 @@
           <a:p>
             <a:fld id="{3C8DE1CA-96BE-47A0-88EC-B088DD3EF55D}" type="datetimeFigureOut">
               <a:rPr lang="en-US" smtClean="0"/>
-              <a:t>11/12/2020</a:t>
+              <a:t>11/13/20</a:t>
             </a:fld>
             <a:endParaRPr lang="en-US" dirty="0"/>
           </a:p>
@@ -406,7 +406,7 @@
           <a:p>
             <a:fld id="{989A8019-75BF-41C6-8A54-8F38AF89855A}" type="datetimeFigureOut">
               <a:rPr lang="en-US" smtClean="0"/>
-              <a:t>11/12/2020</a:t>
+              <a:t>11/13/20</a:t>
             </a:fld>
             <a:endParaRPr lang="en-US" dirty="0"/>
           </a:p>
@@ -1250,7 +1250,7 @@
           <a:p>
             <a:fld id="{ABD4F8E3-4ED9-44B4-99E6-8A3D2CF8D415}" type="datetime4">
               <a:rPr lang="en-US" smtClean="0"/>
-              <a:t>November 12, 2020</a:t>
+              <a:t>November 13, 2020</a:t>
             </a:fld>
             <a:endParaRPr lang="en-US" dirty="0"/>
           </a:p>
@@ -1931,7 +1931,7 @@
             <a:fld id="{9B7EE7B1-A6C1-4E39-8665-A73ED03F32E1}" type="datetimeFigureOut">
               <a:rPr lang="en-US" smtClean="0"/>
               <a:pPr/>
-              <a:t>11/12/2020</a:t>
+              <a:t>11/13/20</a:t>
             </a:fld>
             <a:endParaRPr lang="en-US" dirty="0"/>
           </a:p>
@@ -2356,7 +2356,7 @@
             <a:fld id="{9B7EE7B1-A6C1-4E39-8665-A73ED03F32E1}" type="datetimeFigureOut">
               <a:rPr lang="en-US" smtClean="0"/>
               <a:pPr/>
-              <a:t>11/12/2020</a:t>
+              <a:t>11/13/20</a:t>
             </a:fld>
             <a:endParaRPr lang="en-US" dirty="0"/>
           </a:p>
@@ -2780,7 +2780,7 @@
             <a:fld id="{9B7EE7B1-A6C1-4E39-8665-A73ED03F32E1}" type="datetimeFigureOut">
               <a:rPr lang="en-US" smtClean="0"/>
               <a:pPr/>
-              <a:t>11/12/2020</a:t>
+              <a:t>11/13/20</a:t>
             </a:fld>
             <a:endParaRPr lang="en-US" dirty="0"/>
           </a:p>
@@ -3705,7 +3705,7 @@
             <a:fld id="{9B7EE7B1-A6C1-4E39-8665-A73ED03F32E1}" type="datetimeFigureOut">
               <a:rPr lang="en-US" smtClean="0"/>
               <a:pPr/>
-              <a:t>11/12/2020</a:t>
+              <a:t>11/13/20</a:t>
             </a:fld>
             <a:endParaRPr lang="en-US" dirty="0"/>
           </a:p>
@@ -4820,7 +4820,7 @@
             <a:fld id="{9B7EE7B1-A6C1-4E39-8665-A73ED03F32E1}" type="datetimeFigureOut">
               <a:rPr lang="en-US" smtClean="0"/>
               <a:pPr/>
-              <a:t>11/12/2020</a:t>
+              <a:t>11/13/20</a:t>
             </a:fld>
             <a:endParaRPr lang="en-US" dirty="0"/>
           </a:p>
@@ -5968,7 +5968,7 @@
             <a:fld id="{9B7EE7B1-A6C1-4E39-8665-A73ED03F32E1}" type="datetimeFigureOut">
               <a:rPr lang="en-US" smtClean="0"/>
               <a:pPr/>
-              <a:t>11/12/2020</a:t>
+              <a:t>11/13/20</a:t>
             </a:fld>
             <a:endParaRPr lang="en-US" dirty="0"/>
           </a:p>
@@ -6243,7 +6243,7 @@
             <a:fld id="{9B7EE7B1-A6C1-4E39-8665-A73ED03F32E1}" type="datetimeFigureOut">
               <a:rPr lang="en-US" smtClean="0"/>
               <a:pPr/>
-              <a:t>11/12/2020</a:t>
+              <a:t>11/13/20</a:t>
             </a:fld>
             <a:endParaRPr lang="en-US" dirty="0"/>
           </a:p>
@@ -9996,7 +9996,7 @@
         </p:nvSpPr>
         <p:spPr>
           <a:xfrm>
-            <a:off x="6079677" y="1986494"/>
+            <a:off x="6117824" y="2386210"/>
             <a:ext cx="4572000" cy="3007727"/>
           </a:xfrm>
           <a:prstGeom prst="rect">
@@ -12167,14 +12167,14 @@
           </a:ln>
           <a:extLst>
             <a:ext uri="{909E8E84-426E-40dd-AFC4-6F175D3DCCD1}">
-              <a14:hiddenFill xmlns="" xmlns:a14="http://schemas.microsoft.com/office/drawing/2010/main">
+              <a14:hiddenFill xmlns:a14="http://schemas.microsoft.com/office/drawing/2010/main" xmlns="">
                 <a:solidFill>
                   <a:srgbClr val="FFFFFF"/>
                 </a:solidFill>
               </a14:hiddenFill>
             </a:ext>
             <a:ext uri="{91240B29-F687-4f45-9708-019B960494DF}">
-              <a14:hiddenLine xmlns="" xmlns:a14="http://schemas.microsoft.com/office/drawing/2010/main" w="9525">
+              <a14:hiddenLine xmlns:a14="http://schemas.microsoft.com/office/drawing/2010/main" xmlns="" w="9525">
                 <a:solidFill>
                   <a:srgbClr val="000000"/>
                 </a:solidFill>
@@ -12184,7 +12184,7 @@
               </a14:hiddenLine>
             </a:ext>
             <a:ext uri="{FAA26D3D-D897-4be2-8F04-BA451C77F1D7}">
-              <ma14:placeholderFlag xmlns="" xmlns:ma14="http://schemas.microsoft.com/office/mac/drawingml/2011/main" val="1"/>
+              <ma14:placeholderFlag xmlns:ma14="http://schemas.microsoft.com/office/mac/drawingml/2011/main" xmlns="" val="1"/>
             </a:ext>
           </a:extLst>
         </p:spPr>
@@ -12665,14 +12665,14 @@
           </a:ln>
           <a:extLst>
             <a:ext uri="{909E8E84-426E-40dd-AFC4-6F175D3DCCD1}">
-              <a14:hiddenFill xmlns="" xmlns:a14="http://schemas.microsoft.com/office/drawing/2010/main">
+              <a14:hiddenFill xmlns:a14="http://schemas.microsoft.com/office/drawing/2010/main" xmlns="">
                 <a:solidFill>
                   <a:srgbClr val="FFFFFF"/>
                 </a:solidFill>
               </a14:hiddenFill>
             </a:ext>
             <a:ext uri="{91240B29-F687-4f45-9708-019B960494DF}">
-              <a14:hiddenLine xmlns="" xmlns:a14="http://schemas.microsoft.com/office/drawing/2010/main" w="9525">
+              <a14:hiddenLine xmlns:a14="http://schemas.microsoft.com/office/drawing/2010/main" xmlns="" w="9525">
                 <a:solidFill>
                   <a:srgbClr val="000000"/>
                 </a:solidFill>
@@ -12682,7 +12682,7 @@
               </a14:hiddenLine>
             </a:ext>
             <a:ext uri="{FAA26D3D-D897-4be2-8F04-BA451C77F1D7}">
-              <ma14:placeholderFlag xmlns="" xmlns:ma14="http://schemas.microsoft.com/office/mac/drawingml/2011/main" val="1"/>
+              <ma14:placeholderFlag xmlns:ma14="http://schemas.microsoft.com/office/mac/drawingml/2011/main" xmlns="" val="1"/>
             </a:ext>
           </a:extLst>
         </p:spPr>
@@ -13045,14 +13045,14 @@
           </a:ln>
           <a:extLst>
             <a:ext uri="{909E8E84-426E-40dd-AFC4-6F175D3DCCD1}">
-              <a14:hiddenFill xmlns="" xmlns:a14="http://schemas.microsoft.com/office/drawing/2010/main">
+              <a14:hiddenFill xmlns:a14="http://schemas.microsoft.com/office/drawing/2010/main" xmlns="">
                 <a:solidFill>
                   <a:srgbClr val="FFFFFF"/>
                 </a:solidFill>
               </a14:hiddenFill>
             </a:ext>
             <a:ext uri="{91240B29-F687-4f45-9708-019B960494DF}">
-              <a14:hiddenLine xmlns="" xmlns:a14="http://schemas.microsoft.com/office/drawing/2010/main" w="9525">
+              <a14:hiddenLine xmlns:a14="http://schemas.microsoft.com/office/drawing/2010/main" xmlns="" w="9525">
                 <a:solidFill>
                   <a:srgbClr val="000000"/>
                 </a:solidFill>
@@ -13062,7 +13062,7 @@
               </a14:hiddenLine>
             </a:ext>
             <a:ext uri="{FAA26D3D-D897-4be2-8F04-BA451C77F1D7}">
-              <ma14:placeholderFlag xmlns="" xmlns:ma14="http://schemas.microsoft.com/office/mac/drawingml/2011/main" val="1"/>
+              <ma14:placeholderFlag xmlns:ma14="http://schemas.microsoft.com/office/mac/drawingml/2011/main" xmlns="" val="1"/>
             </a:ext>
           </a:extLst>
         </p:spPr>
@@ -14487,14 +14487,14 @@
           </a:ln>
           <a:extLst>
             <a:ext uri="{909E8E84-426E-40dd-AFC4-6F175D3DCCD1}">
-              <a14:hiddenFill xmlns="" xmlns:a14="http://schemas.microsoft.com/office/drawing/2010/main">
+              <a14:hiddenFill xmlns:a14="http://schemas.microsoft.com/office/drawing/2010/main" xmlns="">
                 <a:solidFill>
                   <a:srgbClr val="FFFFFF"/>
                 </a:solidFill>
               </a14:hiddenFill>
             </a:ext>
             <a:ext uri="{91240B29-F687-4f45-9708-019B960494DF}">
-              <a14:hiddenLine xmlns="" xmlns:a14="http://schemas.microsoft.com/office/drawing/2010/main" w="9525">
+              <a14:hiddenLine xmlns:a14="http://schemas.microsoft.com/office/drawing/2010/main" xmlns="" w="9525">
                 <a:solidFill>
                   <a:srgbClr val="000000"/>
                 </a:solidFill>
@@ -14504,7 +14504,7 @@
               </a14:hiddenLine>
             </a:ext>
             <a:ext uri="{FAA26D3D-D897-4be2-8F04-BA451C77F1D7}">
-              <ma14:placeholderFlag xmlns="" xmlns:ma14="http://schemas.microsoft.com/office/mac/drawingml/2011/main" val="1"/>
+              <ma14:placeholderFlag xmlns:ma14="http://schemas.microsoft.com/office/mac/drawingml/2011/main" xmlns="" val="1"/>
             </a:ext>
           </a:extLst>
         </p:spPr>
@@ -15835,14 +15835,14 @@
           </a:ln>
           <a:extLst>
             <a:ext uri="{909E8E84-426E-40dd-AFC4-6F175D3DCCD1}">
-              <a14:hiddenFill xmlns="" xmlns:a14="http://schemas.microsoft.com/office/drawing/2010/main">
+              <a14:hiddenFill xmlns:a14="http://schemas.microsoft.com/office/drawing/2010/main" xmlns="">
                 <a:solidFill>
                   <a:srgbClr val="FFFFFF"/>
                 </a:solidFill>
               </a14:hiddenFill>
             </a:ext>
             <a:ext uri="{91240B29-F687-4f45-9708-019B960494DF}">
-              <a14:hiddenLine xmlns="" xmlns:a14="http://schemas.microsoft.com/office/drawing/2010/main" w="9525">
+              <a14:hiddenLine xmlns:a14="http://schemas.microsoft.com/office/drawing/2010/main" xmlns="" w="9525">
                 <a:solidFill>
                   <a:srgbClr val="000000"/>
                 </a:solidFill>
@@ -15852,7 +15852,7 @@
               </a14:hiddenLine>
             </a:ext>
             <a:ext uri="{FAA26D3D-D897-4be2-8F04-BA451C77F1D7}">
-              <ma14:placeholderFlag xmlns="" xmlns:ma14="http://schemas.microsoft.com/office/mac/drawingml/2011/main" val="1"/>
+              <ma14:placeholderFlag xmlns:ma14="http://schemas.microsoft.com/office/mac/drawingml/2011/main" xmlns="" val="1"/>
             </a:ext>
           </a:extLst>
         </p:spPr>
@@ -16504,14 +16504,14 @@
           </a:ln>
           <a:extLst>
             <a:ext uri="{909E8E84-426E-40dd-AFC4-6F175D3DCCD1}">
-              <a14:hiddenFill xmlns="" xmlns:a14="http://schemas.microsoft.com/office/drawing/2010/main">
+              <a14:hiddenFill xmlns:a14="http://schemas.microsoft.com/office/drawing/2010/main" xmlns="">
                 <a:solidFill>
                   <a:srgbClr val="FFFFFF"/>
                 </a:solidFill>
               </a14:hiddenFill>
             </a:ext>
             <a:ext uri="{91240B29-F687-4f45-9708-019B960494DF}">
-              <a14:hiddenLine xmlns="" xmlns:a14="http://schemas.microsoft.com/office/drawing/2010/main" w="9525">
+              <a14:hiddenLine xmlns:a14="http://schemas.microsoft.com/office/drawing/2010/main" xmlns="" w="9525">
                 <a:solidFill>
                   <a:srgbClr val="000000"/>
                 </a:solidFill>
@@ -16521,7 +16521,7 @@
               </a14:hiddenLine>
             </a:ext>
             <a:ext uri="{FAA26D3D-D897-4be2-8F04-BA451C77F1D7}">
-              <ma14:placeholderFlag xmlns="" xmlns:ma14="http://schemas.microsoft.com/office/mac/drawingml/2011/main" val="1"/>
+              <ma14:placeholderFlag xmlns:ma14="http://schemas.microsoft.com/office/mac/drawingml/2011/main" xmlns="" val="1"/>
             </a:ext>
           </a:extLst>
         </p:spPr>
@@ -16623,14 +16623,14 @@
           </a:ln>
           <a:extLst>
             <a:ext uri="{909E8E84-426E-40dd-AFC4-6F175D3DCCD1}">
-              <a14:hiddenFill xmlns="" xmlns:a14="http://schemas.microsoft.com/office/drawing/2010/main">
+              <a14:hiddenFill xmlns:a14="http://schemas.microsoft.com/office/drawing/2010/main" xmlns="">
                 <a:solidFill>
                   <a:srgbClr val="FFFFFF"/>
                 </a:solidFill>
               </a14:hiddenFill>
             </a:ext>
             <a:ext uri="{91240B29-F687-4f45-9708-019B960494DF}">
-              <a14:hiddenLine xmlns="" xmlns:a14="http://schemas.microsoft.com/office/drawing/2010/main" w="9525">
+              <a14:hiddenLine xmlns:a14="http://schemas.microsoft.com/office/drawing/2010/main" xmlns="" w="9525">
                 <a:solidFill>
                   <a:srgbClr val="000000"/>
                 </a:solidFill>
@@ -16640,7 +16640,7 @@
               </a14:hiddenLine>
             </a:ext>
             <a:ext uri="{FAA26D3D-D897-4be2-8F04-BA451C77F1D7}">
-              <ma14:placeholderFlag xmlns="" xmlns:ma14="http://schemas.microsoft.com/office/mac/drawingml/2011/main" val="1"/>
+              <ma14:placeholderFlag xmlns:ma14="http://schemas.microsoft.com/office/mac/drawingml/2011/main" xmlns="" val="1"/>
             </a:ext>
           </a:extLst>
         </p:spPr>
@@ -16742,14 +16742,14 @@
           </a:ln>
           <a:extLst>
             <a:ext uri="{909E8E84-426E-40dd-AFC4-6F175D3DCCD1}">
-              <a14:hiddenFill xmlns="" xmlns:a14="http://schemas.microsoft.com/office/drawing/2010/main">
+              <a14:hiddenFill xmlns:a14="http://schemas.microsoft.com/office/drawing/2010/main" xmlns="">
                 <a:solidFill>
                   <a:srgbClr val="FFFFFF"/>
                 </a:solidFill>
               </a14:hiddenFill>
             </a:ext>
             <a:ext uri="{91240B29-F687-4f45-9708-019B960494DF}">
-              <a14:hiddenLine xmlns="" xmlns:a14="http://schemas.microsoft.com/office/drawing/2010/main" w="9525">
+              <a14:hiddenLine xmlns:a14="http://schemas.microsoft.com/office/drawing/2010/main" xmlns="" w="9525">
                 <a:solidFill>
                   <a:srgbClr val="000000"/>
                 </a:solidFill>
@@ -16759,7 +16759,7 @@
               </a14:hiddenLine>
             </a:ext>
             <a:ext uri="{FAA26D3D-D897-4be2-8F04-BA451C77F1D7}">
-              <ma14:placeholderFlag xmlns="" xmlns:ma14="http://schemas.microsoft.com/office/mac/drawingml/2011/main" val="1"/>
+              <ma14:placeholderFlag xmlns:ma14="http://schemas.microsoft.com/office/mac/drawingml/2011/main" xmlns="" val="1"/>
             </a:ext>
           </a:extLst>
         </p:spPr>
@@ -16820,14 +16820,14 @@
           </a:ln>
           <a:extLst>
             <a:ext uri="{909E8E84-426E-40dd-AFC4-6F175D3DCCD1}">
-              <a14:hiddenFill xmlns="" xmlns:a14="http://schemas.microsoft.com/office/drawing/2010/main">
+              <a14:hiddenFill xmlns:a14="http://schemas.microsoft.com/office/drawing/2010/main" xmlns="">
                 <a:solidFill>
                   <a:srgbClr val="FFFFFF"/>
                 </a:solidFill>
               </a14:hiddenFill>
             </a:ext>
             <a:ext uri="{91240B29-F687-4f45-9708-019B960494DF}">
-              <a14:hiddenLine xmlns="" xmlns:a14="http://schemas.microsoft.com/office/drawing/2010/main" w="9525">
+              <a14:hiddenLine xmlns:a14="http://schemas.microsoft.com/office/drawing/2010/main" xmlns="" w="9525">
                 <a:solidFill>
                   <a:srgbClr val="000000"/>
                 </a:solidFill>
@@ -16837,7 +16837,7 @@
               </a14:hiddenLine>
             </a:ext>
             <a:ext uri="{FAA26D3D-D897-4be2-8F04-BA451C77F1D7}">
-              <ma14:placeholderFlag xmlns="" xmlns:ma14="http://schemas.microsoft.com/office/mac/drawingml/2011/main" val="1"/>
+              <ma14:placeholderFlag xmlns:ma14="http://schemas.microsoft.com/office/mac/drawingml/2011/main" xmlns="" val="1"/>
             </a:ext>
           </a:extLst>
         </p:spPr>
@@ -17193,14 +17193,14 @@
           </a:ln>
           <a:extLst>
             <a:ext uri="{909E8E84-426E-40dd-AFC4-6F175D3DCCD1}">
-              <a14:hiddenFill xmlns="" xmlns:a14="http://schemas.microsoft.com/office/drawing/2010/main">
+              <a14:hiddenFill xmlns:a14="http://schemas.microsoft.com/office/drawing/2010/main" xmlns="">
                 <a:solidFill>
                   <a:srgbClr val="FFFFFF"/>
                 </a:solidFill>
               </a14:hiddenFill>
             </a:ext>
             <a:ext uri="{91240B29-F687-4f45-9708-019B960494DF}">
-              <a14:hiddenLine xmlns="" xmlns:a14="http://schemas.microsoft.com/office/drawing/2010/main" w="9525">
+              <a14:hiddenLine xmlns:a14="http://schemas.microsoft.com/office/drawing/2010/main" xmlns="" w="9525">
                 <a:solidFill>
                   <a:srgbClr val="000000"/>
                 </a:solidFill>
@@ -17210,7 +17210,7 @@
               </a14:hiddenLine>
             </a:ext>
             <a:ext uri="{FAA26D3D-D897-4be2-8F04-BA451C77F1D7}">
-              <ma14:placeholderFlag xmlns="" xmlns:ma14="http://schemas.microsoft.com/office/mac/drawingml/2011/main" val="1"/>
+              <ma14:placeholderFlag xmlns:ma14="http://schemas.microsoft.com/office/mac/drawingml/2011/main" xmlns="" val="1"/>
             </a:ext>
           </a:extLst>
         </p:spPr>
@@ -17470,14 +17470,14 @@
         </a:ln>
         <a:extLst>
           <a:ext uri="{909E8E84-426E-40dd-AFC4-6F175D3DCCD1}">
-            <a14:hiddenFill xmlns="" xmlns:a14="http://schemas.microsoft.com/office/drawing/2010/main" xmlns:p="http://schemas.openxmlformats.org/presentationml/2006/main" xmlns:r="http://schemas.openxmlformats.org/officeDocument/2006/relationships">
+            <a14:hiddenFill xmlns:r="http://schemas.openxmlformats.org/officeDocument/2006/relationships" xmlns:p="http://schemas.openxmlformats.org/presentationml/2006/main" xmlns:a14="http://schemas.microsoft.com/office/drawing/2010/main" xmlns="">
               <a:solidFill>
                 <a:srgbClr val="FFFFFF"/>
               </a:solidFill>
             </a14:hiddenFill>
           </a:ext>
           <a:ext uri="{91240B29-F687-4f45-9708-019B960494DF}">
-            <a14:hiddenLine xmlns="" xmlns:a14="http://schemas.microsoft.com/office/drawing/2010/main" xmlns:p="http://schemas.openxmlformats.org/presentationml/2006/main" xmlns:r="http://schemas.openxmlformats.org/officeDocument/2006/relationships" w="9525">
+            <a14:hiddenLine xmlns:r="http://schemas.openxmlformats.org/officeDocument/2006/relationships" xmlns:p="http://schemas.openxmlformats.org/presentationml/2006/main" xmlns:a14="http://schemas.microsoft.com/office/drawing/2010/main" xmlns="" w="9525">
               <a:solidFill>
                 <a:srgbClr val="000000"/>
               </a:solidFill>
@@ -17487,7 +17487,7 @@
             </a14:hiddenLine>
           </a:ext>
           <a:ext uri="{FAA26D3D-D897-4be2-8F04-BA451C77F1D7}">
-            <ma14:placeholderFlag xmlns="" xmlns:ma14="http://schemas.microsoft.com/office/mac/drawingml/2011/main" xmlns:p="http://schemas.openxmlformats.org/presentationml/2006/main" xmlns:r="http://schemas.openxmlformats.org/officeDocument/2006/relationships" val="1"/>
+            <ma14:placeholderFlag xmlns:r="http://schemas.openxmlformats.org/officeDocument/2006/relationships" xmlns:p="http://schemas.openxmlformats.org/presentationml/2006/main" xmlns:ma14="http://schemas.microsoft.com/office/mac/drawingml/2011/main" xmlns="" val="1"/>
           </a:ext>
         </a:extLst>
       </a:spPr>
@@ -18107,18 +18107,18 @@
 </file>
 
 <file path=customXml/item1.xml><?xml version="1.0" encoding="utf-8"?>
-<p:properties xmlns:p="http://schemas.microsoft.com/office/2006/metadata/properties" xmlns:xsi="http://www.w3.org/2001/XMLSchema-instance" xmlns:pc="http://schemas.microsoft.com/office/infopath/2007/PartnerControls">
-  <documentManagement/>
-</p:properties>
-</file>
-
-<file path=customXml/item2.xml><?xml version="1.0" encoding="utf-8"?>
 <?mso-contentType ?>
 <FormTemplates xmlns="http://schemas.microsoft.com/sharepoint/v3/contenttype/forms">
   <Display>DocumentLibraryForm</Display>
   <Edit>DocumentLibraryForm</Edit>
   <New>DocumentLibraryForm</New>
 </FormTemplates>
+</file>
+
+<file path=customXml/item2.xml><?xml version="1.0" encoding="utf-8"?>
+<p:properties xmlns:p="http://schemas.microsoft.com/office/2006/metadata/properties" xmlns:xsi="http://www.w3.org/2001/XMLSchema-instance" xmlns:pc="http://schemas.microsoft.com/office/infopath/2007/PartnerControls">
+  <documentManagement/>
+</p:properties>
 </file>
 
 <file path=customXml/item3.xml><?xml version="1.0" encoding="utf-8"?>
@@ -18325,6 +18325,14 @@
 </file>
 
 <file path=customXml/itemProps1.xml><?xml version="1.0" encoding="utf-8"?>
+<ds:datastoreItem xmlns:ds="http://schemas.openxmlformats.org/officeDocument/2006/customXml" ds:itemID="{1A69509B-8DF1-48CE-ADA7-86F480E19F45}">
+  <ds:schemaRefs>
+    <ds:schemaRef ds:uri="http://schemas.microsoft.com/sharepoint/v3/contenttype/forms"/>
+  </ds:schemaRefs>
+</ds:datastoreItem>
+</file>
+
+<file path=customXml/itemProps2.xml><?xml version="1.0" encoding="utf-8"?>
 <ds:datastoreItem xmlns:ds="http://schemas.openxmlformats.org/officeDocument/2006/customXml" ds:itemID="{9949E77A-FB8A-40A9-9E89-661347A063BC}">
   <ds:schemaRefs>
     <ds:schemaRef ds:uri="a9307db5-a10f-4591-aeef-fc8a1fa38b1e"/>
@@ -18337,14 +18345,6 @@
     <ds:schemaRef ds:uri="fcf4638a-8e7d-4091-9357-53a8b78e0f7b"/>
     <ds:schemaRef ds:uri="http://schemas.microsoft.com/office/2006/metadata/properties"/>
     <ds:schemaRef ds:uri="http://purl.org/dc/dcmitype/"/>
-  </ds:schemaRefs>
-</ds:datastoreItem>
-</file>
-
-<file path=customXml/itemProps2.xml><?xml version="1.0" encoding="utf-8"?>
-<ds:datastoreItem xmlns:ds="http://schemas.openxmlformats.org/officeDocument/2006/customXml" ds:itemID="{1A69509B-8DF1-48CE-ADA7-86F480E19F45}">
-  <ds:schemaRefs>
-    <ds:schemaRef ds:uri="http://schemas.microsoft.com/sharepoint/v3/contenttype/forms"/>
   </ds:schemaRefs>
 </ds:datastoreItem>
 </file>

</xml_diff>